<commit_message>
Added reference to references page
</commit_message>
<xml_diff>
--- a/Agile_Presentation.pptx
+++ b/Agile_Presentation.pptx
@@ -11019,13 +11019,13 @@
   <p:clrMapOvr>
     <a:masterClrMapping/>
   </p:clrMapOvr>
-  <mc:AlternateContent xmlns:mc="http://schemas.openxmlformats.org/markup-compatibility/2006">
-    <mc:Choice xmlns:p14="http://schemas.microsoft.com/office/powerpoint/2010/main" Requires="p14">
+  <mc:AlternateContent xmlns:mc="http://schemas.openxmlformats.org/markup-compatibility/2006" xmlns:p14="http://schemas.microsoft.com/office/powerpoint/2010/main">
+    <mc:Choice Requires="p14">
       <p:transition spd="med" p14:dur="700">
         <p:fade/>
       </p:transition>
     </mc:Choice>
-    <mc:Fallback>
+    <mc:Fallback xmlns="">
       <p:transition spd="med">
         <p:fade/>
       </p:transition>
@@ -11168,8 +11168,8 @@
         </p:nvSpPr>
         <p:spPr>
           <a:xfrm>
-            <a:off x="3291841" y="2356258"/>
-            <a:ext cx="5605272" cy="1200329"/>
+            <a:off x="489204" y="2286501"/>
+            <a:ext cx="8972848" cy="2308324"/>
           </a:xfrm>
           <a:prstGeom prst="rect">
             <a:avLst/>
@@ -11183,33 +11183,202 @@
           <a:lstStyle/>
           <a:p>
             <a:r>
-              <a:rPr lang="en-US" dirty="0"/>
+              <a:rPr lang="en-US" dirty="0">
+                <a:solidFill>
+                  <a:schemeClr val="bg1"/>
+                </a:solidFill>
+              </a:rPr>
               <a:t>Charles G. Cobb. (2015). </a:t>
             </a:r>
             <a:r>
-              <a:rPr lang="en-US" i="1" dirty="0"/>
+              <a:rPr lang="en-US" i="1" dirty="0">
+                <a:solidFill>
+                  <a:schemeClr val="bg1"/>
+                </a:solidFill>
+              </a:rPr>
               <a:t>The Project Manager’s Guide </a:t>
             </a:r>
           </a:p>
           <a:p>
             <a:r>
-              <a:rPr lang="en-US" i="1" dirty="0"/>
-              <a:t>	to Mastering Agile : Principles and </a:t>
-            </a:r>
-            <a:endParaRPr lang="en-US" dirty="0"/>
-          </a:p>
-          <a:p>
-            <a:r>
-              <a:rPr lang="en-US" i="1" dirty="0"/>
-              <a:t>	Practices for an Adaptive Approach</a:t>
+              <a:rPr lang="en-US" i="1" dirty="0">
+                <a:solidFill>
+                  <a:schemeClr val="bg1"/>
+                </a:solidFill>
+              </a:rPr>
+              <a:t>	to Mastering Agile : Principles and Practices for an Adaptive Approach</a:t>
             </a:r>
             <a:r>
-              <a:rPr lang="en-US" dirty="0"/>
+              <a:rPr lang="en-US" dirty="0">
+                <a:solidFill>
+                  <a:schemeClr val="bg1"/>
+                </a:solidFill>
+              </a:rPr>
               <a:t>. Wiley.</a:t>
             </a:r>
-          </a:p>
-          <a:p>
-            <a:endParaRPr lang="en-US" dirty="0"/>
+            <a:br>
+              <a:rPr lang="en-US" dirty="0">
+                <a:solidFill>
+                  <a:schemeClr val="bg1"/>
+                </a:solidFill>
+              </a:rPr>
+            </a:br>
+            <a:br>
+              <a:rPr lang="en-US" dirty="0">
+                <a:solidFill>
+                  <a:schemeClr val="bg1"/>
+                </a:solidFill>
+              </a:rPr>
+            </a:br>
+            <a:r>
+              <a:rPr lang="en-US" i="1" dirty="0">
+                <a:solidFill>
+                  <a:schemeClr val="bg1"/>
+                </a:solidFill>
+              </a:rPr>
+              <a:t>Software Development Life Cycle (SDLC)</a:t>
+            </a:r>
+            <a:r>
+              <a:rPr lang="en-US" dirty="0">
+                <a:solidFill>
+                  <a:schemeClr val="bg1"/>
+                </a:solidFill>
+              </a:rPr>
+              <a:t>. (2021, May 19). Retrieved February 2022, from </a:t>
+            </a:r>
+          </a:p>
+          <a:p>
+            <a:r>
+              <a:rPr lang="en-US" dirty="0">
+                <a:solidFill>
+                  <a:schemeClr val="bg1"/>
+                </a:solidFill>
+              </a:rPr>
+              <a:t>	</a:t>
+            </a:r>
+            <a:r>
+              <a:rPr lang="en-US" dirty="0" err="1">
+                <a:solidFill>
+                  <a:schemeClr val="bg1"/>
+                </a:solidFill>
+              </a:rPr>
+              <a:t>linkedin.com</a:t>
+            </a:r>
+            <a:r>
+              <a:rPr lang="en-US" dirty="0">
+                <a:solidFill>
+                  <a:schemeClr val="bg1"/>
+                </a:solidFill>
+              </a:rPr>
+              <a:t>: </a:t>
+            </a:r>
+            <a:r>
+              <a:rPr lang="en-US" dirty="0">
+                <a:solidFill>
+                  <a:srgbClr val="0563C1"/>
+                </a:solidFill>
+                <a:hlinkClick r:id="rId3">
+                  <a:extLst>
+                    <a:ext uri="{A12FA001-AC4F-418D-AE19-62706E023703}">
+                      <ahyp:hlinkClr xmlns:ahyp="http://schemas.microsoft.com/office/drawing/2018/hyperlinkcolor" val="tx"/>
+                    </a:ext>
+                  </a:extLst>
+                </a:hlinkClick>
+              </a:rPr>
+              <a:t>https://www.linkedin.com/pulse/</a:t>
+            </a:r>
+            <a:r>
+              <a:rPr lang="en-US" dirty="0">
+                <a:solidFill>
+                  <a:schemeClr val="bg1"/>
+                </a:solidFill>
+                <a:hlinkClick r:id="rId3">
+                  <a:extLst>
+                    <a:ext uri="{A12FA001-AC4F-418D-AE19-62706E023703}">
+                      <ahyp:hlinkClr xmlns:ahyp="http://schemas.microsoft.com/office/drawing/2018/hyperlinkcolor" val="tx"/>
+                    </a:ext>
+                  </a:extLst>
+                </a:hlinkClick>
+              </a:rPr>
+              <a:t>software-development-life-</a:t>
+            </a:r>
+            <a:endParaRPr lang="en-US" dirty="0">
+              <a:solidFill>
+                <a:schemeClr val="bg1"/>
+              </a:solidFill>
+            </a:endParaRPr>
+          </a:p>
+          <a:p>
+            <a:r>
+              <a:rPr lang="en-US" dirty="0">
+                <a:solidFill>
+                  <a:schemeClr val="bg1"/>
+                </a:solidFill>
+              </a:rPr>
+              <a:t>	cycle-</a:t>
+            </a:r>
+            <a:r>
+              <a:rPr lang="en-US" dirty="0" err="1">
+                <a:solidFill>
+                  <a:schemeClr val="bg1"/>
+                </a:solidFill>
+              </a:rPr>
+              <a:t>sdlc</a:t>
+            </a:r>
+            <a:r>
+              <a:rPr lang="en-US" dirty="0">
+                <a:solidFill>
+                  <a:schemeClr val="bg1"/>
+                </a:solidFill>
+              </a:rPr>
+              <a:t>-tutorial-</a:t>
+            </a:r>
+            <a:r>
+              <a:rPr lang="en-US" dirty="0" err="1">
+                <a:solidFill>
+                  <a:schemeClr val="bg1"/>
+                </a:solidFill>
+              </a:rPr>
+              <a:t>richard</a:t>
+            </a:r>
+            <a:r>
+              <a:rPr lang="en-US" dirty="0">
+                <a:solidFill>
+                  <a:schemeClr val="bg1"/>
+                </a:solidFill>
+              </a:rPr>
+              <a:t>-</a:t>
+            </a:r>
+            <a:r>
+              <a:rPr lang="en-US" dirty="0" err="1">
+                <a:solidFill>
+                  <a:schemeClr val="bg1"/>
+                </a:solidFill>
+              </a:rPr>
+              <a:t>harris</a:t>
+            </a:r>
+            <a:r>
+              <a:rPr lang="en-US" dirty="0">
+                <a:solidFill>
+                  <a:schemeClr val="bg1"/>
+                </a:solidFill>
+              </a:rPr>
+              <a:t>/</a:t>
+            </a:r>
+          </a:p>
+          <a:p>
+            <a:endParaRPr lang="en-US" dirty="0">
+              <a:solidFill>
+                <a:schemeClr val="bg1"/>
+              </a:solidFill>
+            </a:endParaRPr>
+          </a:p>
+          <a:p>
+            <a:endParaRPr lang="en-US" dirty="0">
+              <a:solidFill>
+                <a:schemeClr val="bg1"/>
+              </a:solidFill>
+            </a:endParaRPr>
           </a:p>
         </p:txBody>
       </p:sp>
@@ -11223,13 +11392,13 @@
   <p:clrMapOvr>
     <a:masterClrMapping/>
   </p:clrMapOvr>
-  <mc:AlternateContent xmlns:mc="http://schemas.openxmlformats.org/markup-compatibility/2006">
-    <mc:Choice xmlns:p14="http://schemas.microsoft.com/office/powerpoint/2010/main" Requires="p14">
+  <mc:AlternateContent xmlns:mc="http://schemas.openxmlformats.org/markup-compatibility/2006" xmlns:p14="http://schemas.microsoft.com/office/powerpoint/2010/main">
+    <mc:Choice Requires="p14">
       <p:transition spd="med" p14:dur="700">
         <p:fade/>
       </p:transition>
     </mc:Choice>
-    <mc:Fallback>
+    <mc:Fallback xmlns="">
       <p:transition spd="med">
         <p:fade/>
       </p:transition>
@@ -11483,13 +11652,13 @@
   <p:clrMapOvr>
     <a:masterClrMapping/>
   </p:clrMapOvr>
-  <mc:AlternateContent xmlns:mc="http://schemas.openxmlformats.org/markup-compatibility/2006">
-    <mc:Choice xmlns:p14="http://schemas.microsoft.com/office/powerpoint/2010/main" Requires="p14">
+  <mc:AlternateContent xmlns:mc="http://schemas.openxmlformats.org/markup-compatibility/2006" xmlns:p14="http://schemas.microsoft.com/office/powerpoint/2010/main">
+    <mc:Choice Requires="p14">
       <p:transition spd="med" p14:dur="700">
         <p:fade/>
       </p:transition>
     </mc:Choice>
-    <mc:Fallback>
+    <mc:Fallback xmlns="">
       <p:transition spd="med">
         <p:fade/>
       </p:transition>

</xml_diff>